<commit_message>
Background Color Alteration to Presentation
</commit_message>
<xml_diff>
--- a/Doc/FinalPresentation/NamcapFinalPresentation.pptx
+++ b/Doc/FinalPresentation/NamcapFinalPresentation.pptx
@@ -123,16 +123,6 @@
 <file path=ppt/slideLayouts/slideLayout1.xml><?xml version="1.0" encoding="utf-8"?>
 <p:sldLayout xmlns:a="http://schemas.openxmlformats.org/drawingml/2006/main" xmlns:r="http://schemas.openxmlformats.org/officeDocument/2006/relationships" xmlns:p="http://schemas.openxmlformats.org/presentationml/2006/main" showMasterSp="0" type="title" preserve="1">
   <p:cSld name="Title Slide">
-    <p:bg>
-      <p:bgPr>
-        <a:solidFill>
-          <a:schemeClr val="bg2">
-            <a:lumMod val="75000"/>
-          </a:schemeClr>
-        </a:solidFill>
-        <a:effectLst/>
-      </p:bgPr>
-    </p:bg>
     <p:spTree>
       <p:nvGrpSpPr>
         <p:cNvPr id="1" name=""/>
@@ -402,9 +392,9 @@
     </p:extLst>
   </p:cSld>
   <p:clrMapOvr>
-    <a:overrideClrMapping bg1="dk1" tx1="lt1" bg2="dk2" tx2="lt2" accent1="accent1" accent2="accent2" accent3="accent3" accent4="accent4" accent5="accent5" accent6="accent6" hlink="hlink" folHlink="folHlink"/>
+    <a:masterClrMapping/>
   </p:clrMapOvr>
-  <p:extLst>
+  <p:extLst mod="1">
     <p:ext uri="{DCECCB84-F9BA-43D5-87BE-67443E8EF086}">
       <p15:sldGuideLst xmlns:p15="http://schemas.microsoft.com/office/powerpoint/2012/main"/>
     </p:ext>
@@ -2800,7 +2790,7 @@
   <p:cSld>
     <p:bg>
       <p:bgRef idx="1001">
-        <a:schemeClr val="bg1"/>
+        <a:schemeClr val="bg2"/>
       </p:bgRef>
     </p:bg>
     <p:spTree>
@@ -3083,7 +3073,7 @@
       </p:ext>
     </p:extLst>
   </p:cSld>
-  <p:clrMap bg1="lt1" tx1="dk1" bg2="lt2" tx2="dk2" accent1="accent1" accent2="accent2" accent3="accent3" accent4="accent4" accent5="accent5" accent6="accent6" hlink="hlink" folHlink="folHlink"/>
+  <p:clrMap bg1="dk1" tx1="lt1" bg2="dk2" tx2="lt2" accent1="accent1" accent2="accent2" accent3="accent3" accent4="accent4" accent5="accent5" accent6="accent6" hlink="hlink" folHlink="folHlink"/>
   <p:sldLayoutIdLst>
     <p:sldLayoutId id="2147483811" r:id="rId1"/>
     <p:sldLayoutId id="2147483812" r:id="rId2"/>
@@ -3456,7 +3446,7 @@
       </a:lvl9pPr>
     </p:otherStyle>
   </p:txStyles>
-  <p:extLst>
+  <p:extLst mod="1">
     <p:ext uri="{27BBF7A9-308A-43DC-89C8-2F10F3537804}">
       <p15:sldGuideLst xmlns:p15="http://schemas.microsoft.com/office/powerpoint/2012/main"/>
     </p:ext>
@@ -3964,13 +3954,16 @@
           <a:bodyPr/>
           <a:lstStyle/>
           <a:p>
-            <a:r>
-              <a:rPr lang="en-CA" dirty="0"/>
-              <a:t>R</a:t>
-            </a:r>
+            <a:endParaRPr lang="en-CA" dirty="0" smtClean="0"/>
+          </a:p>
+          <a:p>
             <a:r>
               <a:rPr lang="en-CA" dirty="0" smtClean="0"/>
-              <a:t>edevelopment of the classic-arcade game, Pacman</a:t>
+              <a:t>Redevelopment </a:t>
+            </a:r>
+            <a:r>
+              <a:rPr lang="en-CA" dirty="0" smtClean="0"/>
+              <a:t>of the classic-arcade game, Pacman</a:t>
             </a:r>
           </a:p>
           <a:p>
@@ -4116,8 +4109,8 @@
         </p:nvSpPr>
         <p:spPr>
           <a:xfrm>
-            <a:off x="5741772" y="1828800"/>
-            <a:ext cx="4115459" cy="4351337"/>
+            <a:off x="6524824" y="1828800"/>
+            <a:ext cx="4113125" cy="4351337"/>
           </a:xfrm>
         </p:spPr>
         <p:txBody>
@@ -4183,10 +4176,10 @@
         </p:nvGrpSpPr>
         <p:grpSpPr>
           <a:xfrm>
-            <a:off x="127149" y="880177"/>
-            <a:ext cx="5718841" cy="6079137"/>
-            <a:chOff x="127149" y="880177"/>
-            <a:chExt cx="5718841" cy="6079137"/>
+            <a:off x="397608" y="880177"/>
+            <a:ext cx="5448382" cy="5127985"/>
+            <a:chOff x="397608" y="880177"/>
+            <a:chExt cx="5448382" cy="5127985"/>
           </a:xfrm>
         </p:grpSpPr>
         <p:grpSp>
@@ -4197,10 +4190,10 @@
           </p:nvGrpSpPr>
           <p:grpSpPr>
             <a:xfrm>
-              <a:off x="642908" y="1881797"/>
-              <a:ext cx="4985120" cy="3989881"/>
-              <a:chOff x="642908" y="1881797"/>
-              <a:chExt cx="4985120" cy="3989881"/>
+              <a:off x="1272990" y="1881797"/>
+              <a:ext cx="4355038" cy="3989881"/>
+              <a:chOff x="1272990" y="1881797"/>
+              <a:chExt cx="4355038" cy="3989881"/>
             </a:xfrm>
           </p:grpSpPr>
           <p:pic>
@@ -4224,7 +4217,7 @@
             </p:blipFill>
             <p:spPr bwMode="auto">
               <a:xfrm>
-                <a:off x="642908" y="3341984"/>
+                <a:off x="1272990" y="3321756"/>
                 <a:ext cx="1014199" cy="1013984"/>
               </a:xfrm>
               <a:prstGeom prst="rect">
@@ -5046,10 +5039,10 @@
           </p:nvGrpSpPr>
           <p:grpSpPr>
             <a:xfrm>
-              <a:off x="251576" y="4361526"/>
-              <a:ext cx="3249824" cy="2597788"/>
-              <a:chOff x="251576" y="4361526"/>
-              <a:chExt cx="3249824" cy="2597788"/>
+              <a:off x="483398" y="4348647"/>
+              <a:ext cx="3018002" cy="1659515"/>
+              <a:chOff x="483398" y="4348647"/>
+              <a:chExt cx="3018002" cy="1659515"/>
             </a:xfrm>
           </p:grpSpPr>
           <p:pic>
@@ -5112,7 +5105,7 @@
             </p:blipFill>
             <p:spPr bwMode="auto">
               <a:xfrm>
-                <a:off x="251576" y="4361526"/>
+                <a:off x="483398" y="4348647"/>
                 <a:ext cx="2183343" cy="670135"/>
               </a:xfrm>
               <a:prstGeom prst="rect">
@@ -5160,8 +5153,8 @@
             </p:blipFill>
             <p:spPr bwMode="auto">
               <a:xfrm rot="5400000">
-                <a:off x="1980130" y="5438044"/>
-                <a:ext cx="2328004" cy="714536"/>
+                <a:off x="2455706" y="4962468"/>
+                <a:ext cx="1376852" cy="714536"/>
               </a:xfrm>
               <a:prstGeom prst="rect">
                 <a:avLst/>
@@ -5307,10 +5300,10 @@
           </p:nvGrpSpPr>
           <p:grpSpPr>
             <a:xfrm>
-              <a:off x="127149" y="2702576"/>
-              <a:ext cx="3380528" cy="670136"/>
-              <a:chOff x="127149" y="2702576"/>
-              <a:chExt cx="3380528" cy="670136"/>
+              <a:off x="397608" y="2702576"/>
+              <a:ext cx="3110069" cy="670136"/>
+              <a:chOff x="397608" y="2702576"/>
+              <a:chExt cx="3110069" cy="670136"/>
             </a:xfrm>
           </p:grpSpPr>
           <p:pic>
@@ -5334,7 +5327,7 @@
             </p:blipFill>
             <p:spPr bwMode="auto">
               <a:xfrm rot="10800000">
-                <a:off x="127149" y="2702576"/>
+                <a:off x="397608" y="2702576"/>
                 <a:ext cx="2751024" cy="670135"/>
               </a:xfrm>
               <a:prstGeom prst="rect">
@@ -5419,9 +5412,9 @@
           <p:grpSpPr>
             <a:xfrm>
               <a:off x="4132482" y="4341843"/>
-              <a:ext cx="1713508" cy="2586745"/>
+              <a:ext cx="1713508" cy="1666319"/>
               <a:chOff x="4132482" y="4341843"/>
-              <a:chExt cx="1713508" cy="2586745"/>
+              <a:chExt cx="1713508" cy="1666319"/>
             </a:xfrm>
           </p:grpSpPr>
           <p:grpSp>
@@ -5547,8 +5540,8 @@
             </p:blipFill>
             <p:spPr bwMode="auto">
               <a:xfrm rot="16200000">
-                <a:off x="3325748" y="5407318"/>
-                <a:ext cx="2328004" cy="714536"/>
+                <a:off x="3854203" y="4981895"/>
+                <a:ext cx="1271094" cy="714536"/>
               </a:xfrm>
               <a:prstGeom prst="rect">
                 <a:avLst/>
@@ -5652,9 +5645,19 @@
             <a:pPr marL="0" indent="0">
               <a:buNone/>
             </a:pPr>
+            <a:endParaRPr lang="en-CA" b="1" dirty="0" smtClean="0"/>
+          </a:p>
+          <a:p>
+            <a:pPr marL="0" indent="0">
+              <a:buNone/>
+            </a:pPr>
             <a:r>
               <a:rPr lang="en-CA" b="1" dirty="0" smtClean="0"/>
-              <a:t>The VPB Approach:</a:t>
+              <a:t>The </a:t>
+            </a:r>
+            <a:r>
+              <a:rPr lang="en-CA" b="1" dirty="0" smtClean="0"/>
+              <a:t>VPB Approach:</a:t>
             </a:r>
           </a:p>
           <a:p>
@@ -5956,10 +5959,14 @@
           <a:bodyPr/>
           <a:lstStyle/>
           <a:p>
-            <a:r>
-              <a:rPr lang="en-CA" dirty="0"/>
+            <a:endParaRPr lang="en-CA" dirty="0" smtClean="0"/>
+          </a:p>
+          <a:p>
+            <a:r>
+              <a:rPr lang="en-CA" dirty="0" smtClean="0"/>
               <a:t>Java</a:t>
             </a:r>
+            <a:endParaRPr lang="en-CA" dirty="0"/>
           </a:p>
           <a:p>
             <a:pPr lvl="1"/>
@@ -6331,11 +6338,7 @@
           <a:p>
             <a:r>
               <a:rPr lang="en-CA" dirty="0" smtClean="0"/>
-              <a:t>Project </a:t>
-            </a:r>
-            <a:r>
-              <a:rPr lang="en-CA" dirty="0" smtClean="0"/>
-              <a:t>Retrospective</a:t>
+              <a:t>Project Retrospective</a:t>
             </a:r>
             <a:endParaRPr lang="en-CA" dirty="0"/>
           </a:p>
@@ -6356,9 +6359,16 @@
           <a:bodyPr/>
           <a:lstStyle/>
           <a:p>
+            <a:endParaRPr lang="en-CA" dirty="0" smtClean="0"/>
+          </a:p>
+          <a:p>
             <a:r>
               <a:rPr lang="en-CA" dirty="0" smtClean="0"/>
-              <a:t>Namcap was successful in recapturing that classic arcade experience while providing a new, unique perspective on Pacman</a:t>
+              <a:t>Namcap </a:t>
+            </a:r>
+            <a:r>
+              <a:rPr lang="en-CA" dirty="0" smtClean="0"/>
+              <a:t>was successful in recapturing that classic arcade experience while providing a new, unique perspective on Pacman</a:t>
             </a:r>
           </a:p>
           <a:p>
@@ -6384,7 +6394,6 @@
               <a:rPr lang="en-CA" dirty="0" smtClean="0"/>
               <a:t>In-game audio</a:t>
             </a:r>
-            <a:endParaRPr lang="en-CA" dirty="0" smtClean="0"/>
           </a:p>
           <a:p>
             <a:r>

</xml_diff>

<commit_message>
Final Iteration of Presentation
</commit_message>
<xml_diff>
--- a/Doc/FinalPresentation/NamcapFinalPresentation.pptx
+++ b/Doc/FinalPresentation/NamcapFinalPresentation.pptx
@@ -3959,11 +3959,7 @@
           <a:p>
             <a:r>
               <a:rPr lang="en-CA" dirty="0" smtClean="0"/>
-              <a:t>Redevelopment </a:t>
-            </a:r>
-            <a:r>
-              <a:rPr lang="en-CA" dirty="0" smtClean="0"/>
-              <a:t>of the classic-arcade game, Pacman</a:t>
+              <a:t>Redevelopment of the classic-arcade game, Pacman</a:t>
             </a:r>
           </a:p>
           <a:p>
@@ -5653,11 +5649,7 @@
             </a:pPr>
             <a:r>
               <a:rPr lang="en-CA" b="1" dirty="0" smtClean="0"/>
-              <a:t>The </a:t>
-            </a:r>
-            <a:r>
-              <a:rPr lang="en-CA" b="1" dirty="0" smtClean="0"/>
-              <a:t>VPB Approach:</a:t>
+              <a:t>The VPB Approach:</a:t>
             </a:r>
           </a:p>
           <a:p>
@@ -6074,29 +6066,95 @@
           <a:bodyPr/>
           <a:lstStyle/>
           <a:p>
-            <a:endParaRPr lang="en-CA"/>
-          </a:p>
-        </p:txBody>
-      </p:sp>
-      <p:sp>
-        <p:nvSpPr>
-          <p:cNvPr id="6" name="Content Placeholder 5"/>
-          <p:cNvSpPr>
-            <a:spLocks noGrp="1"/>
-          </p:cNvSpPr>
-          <p:nvPr>
-            <p:ph sz="half" idx="2"/>
-          </p:nvPr>
-        </p:nvSpPr>
-        <p:spPr/>
-        <p:txBody>
-          <a:bodyPr/>
-          <a:lstStyle/>
-          <a:p>
-            <a:endParaRPr lang="en-CA"/>
-          </a:p>
-        </p:txBody>
-      </p:sp>
+            <a:r>
+              <a:rPr lang="en-CA" dirty="0" smtClean="0"/>
+              <a:t>Google Forms for Usability Survey</a:t>
+            </a:r>
+          </a:p>
+          <a:p>
+            <a:r>
+              <a:rPr lang="en-CA" dirty="0" smtClean="0"/>
+              <a:t>Assesses system usability (also learnability)</a:t>
+            </a:r>
+          </a:p>
+          <a:p>
+            <a:endParaRPr lang="en-CA" dirty="0"/>
+          </a:p>
+          <a:p>
+            <a:r>
+              <a:rPr lang="en-CA" dirty="0" smtClean="0"/>
+              <a:t>90% of users gave the game 9/10 (and above) </a:t>
+            </a:r>
+            <a:r>
+              <a:rPr lang="en-CA" dirty="0" smtClean="0"/>
+              <a:t>for interface user-friendliness</a:t>
+            </a:r>
+          </a:p>
+          <a:p>
+            <a:pPr marL="0" indent="0">
+              <a:buNone/>
+            </a:pPr>
+            <a:r>
+              <a:rPr lang="en-CA" b="1" dirty="0" smtClean="0"/>
+              <a:t>Difficulty:</a:t>
+            </a:r>
+          </a:p>
+          <a:p>
+            <a:pPr lvl="1"/>
+            <a:r>
+              <a:rPr lang="en-CA" dirty="0" smtClean="0"/>
+              <a:t>30% of users gave 5/10</a:t>
+            </a:r>
+          </a:p>
+          <a:p>
+            <a:pPr lvl="1"/>
+            <a:r>
+              <a:rPr lang="en-CA" dirty="0" smtClean="0"/>
+              <a:t>30% of users gave &lt; 5/10</a:t>
+            </a:r>
+          </a:p>
+          <a:p>
+            <a:pPr lvl="1"/>
+            <a:r>
+              <a:rPr lang="en-CA" dirty="0" smtClean="0"/>
+              <a:t>40% of users gave &gt; 5/10</a:t>
+            </a:r>
+          </a:p>
+        </p:txBody>
+      </p:sp>
+      <p:pic>
+        <p:nvPicPr>
+          <p:cNvPr id="2" name="Picture 1"/>
+          <p:cNvPicPr>
+            <a:picLocks noChangeAspect="1"/>
+          </p:cNvPicPr>
+          <p:nvPr/>
+        </p:nvPicPr>
+        <p:blipFill rotWithShape="1">
+          <a:blip r:embed="rId2"/>
+          <a:srcRect t="1" r="1654" b="682"/>
+          <a:stretch/>
+        </p:blipFill>
+        <p:spPr>
+          <a:xfrm>
+            <a:off x="6591233" y="1428481"/>
+            <a:ext cx="3737624" cy="4843530"/>
+          </a:xfrm>
+          <a:prstGeom prst="rect">
+            <a:avLst/>
+          </a:prstGeom>
+          <a:ln>
+            <a:noFill/>
+          </a:ln>
+          <a:effectLst>
+            <a:outerShdw blurRad="292100" dist="139700" dir="2700000" algn="tl" rotWithShape="0">
+              <a:srgbClr val="333333">
+                <a:alpha val="65000"/>
+              </a:srgbClr>
+            </a:outerShdw>
+          </a:effectLst>
+        </p:spPr>
+      </p:pic>
     </p:spTree>
     <p:extLst>
       <p:ext uri="{BB962C8B-B14F-4D97-AF65-F5344CB8AC3E}">
@@ -6175,6 +6233,38 @@
           <a:bodyPr/>
           <a:lstStyle/>
           <a:p>
+            <a:r>
+              <a:rPr lang="en-CA" dirty="0" smtClean="0"/>
+              <a:t>Usability Survey used to assess learnability as well</a:t>
+            </a:r>
+          </a:p>
+          <a:p>
+            <a:endParaRPr lang="en-CA" dirty="0"/>
+          </a:p>
+          <a:p>
+            <a:pPr marL="0" indent="0">
+              <a:buNone/>
+            </a:pPr>
+            <a:r>
+              <a:rPr lang="en-CA" dirty="0" smtClean="0"/>
+              <a:t>100% of users </a:t>
+            </a:r>
+            <a:r>
+              <a:rPr lang="en-CA" dirty="0" smtClean="0"/>
+              <a:t>surveyed responded:</a:t>
+            </a:r>
+          </a:p>
+          <a:p>
+            <a:r>
+              <a:rPr lang="en-CA" dirty="0" smtClean="0"/>
+              <a:t>Instructions page clearly defines the objective of Namcap</a:t>
+            </a:r>
+          </a:p>
+          <a:p>
+            <a:r>
+              <a:rPr lang="en-CA" dirty="0" smtClean="0"/>
+              <a:t>Able to fully grasp the overall gameplay after one play-through</a:t>
+            </a:r>
             <a:endParaRPr lang="en-CA" dirty="0"/>
           </a:p>
         </p:txBody>
@@ -6227,7 +6317,37 @@
           <a:bodyPr/>
           <a:lstStyle/>
           <a:p>
+            <a:r>
+              <a:rPr lang="en-CA" dirty="0" smtClean="0"/>
+              <a:t>Generic design allows for efficient implementation of future features</a:t>
+            </a:r>
             <a:endParaRPr lang="en-CA" dirty="0"/>
+          </a:p>
+          <a:p>
+            <a:r>
+              <a:rPr lang="en-CA" dirty="0" smtClean="0"/>
+              <a:t>Developed character &amp; object (dot, big dot) infrastructure</a:t>
+            </a:r>
+          </a:p>
+          <a:p>
+            <a:endParaRPr lang="en-CA" dirty="0"/>
+          </a:p>
+          <a:p>
+            <a:r>
+              <a:rPr lang="en-CA" dirty="0" smtClean="0"/>
+              <a:t>Game runs on any laptop with the JRE installed</a:t>
+            </a:r>
+          </a:p>
+          <a:p>
+            <a:pPr lvl="1"/>
+            <a:r>
+              <a:rPr lang="en-CA" dirty="0" smtClean="0"/>
+              <a:t>Runs on Windows &amp; Mac/Linux</a:t>
+            </a:r>
+            <a:endParaRPr lang="en-CA" dirty="0"/>
+          </a:p>
+          <a:p>
+            <a:endParaRPr lang="en-CA" dirty="0" smtClean="0"/>
           </a:p>
         </p:txBody>
       </p:sp>
@@ -6364,11 +6484,7 @@
           <a:p>
             <a:r>
               <a:rPr lang="en-CA" dirty="0" smtClean="0"/>
-              <a:t>Namcap </a:t>
-            </a:r>
-            <a:r>
-              <a:rPr lang="en-CA" dirty="0" smtClean="0"/>
-              <a:t>was successful in recapturing that classic arcade experience while providing a new, unique perspective on Pacman</a:t>
+              <a:t>Namcap was successful in recapturing that classic arcade experience while providing a new, unique perspective on Pacman</a:t>
             </a:r>
           </a:p>
           <a:p>

</xml_diff>

<commit_message>
Minor Textual Modification to Presentation
Adjustment of text spacing to headers.
</commit_message>
<xml_diff>
--- a/Doc/FinalPresentation/NamcapFinalPresentation.pptx
+++ b/Doc/FinalPresentation/NamcapFinalPresentation.pptx
@@ -278,7 +278,7 @@
           <a:p>
             <a:fld id="{B3674AC4-5004-4132-B6AA-0D083DFAD988}" type="datetimeFigureOut">
               <a:rPr lang="en-CA" smtClean="0"/>
-              <a:t>2016-12-01</a:t>
+              <a:t>2016-12-02</a:t>
             </a:fld>
             <a:endParaRPr lang="en-CA"/>
           </a:p>
@@ -511,7 +511,7 @@
           <a:p>
             <a:fld id="{B3674AC4-5004-4132-B6AA-0D083DFAD988}" type="datetimeFigureOut">
               <a:rPr lang="en-CA" smtClean="0"/>
-              <a:t>2016-12-01</a:t>
+              <a:t>2016-12-02</a:t>
             </a:fld>
             <a:endParaRPr lang="en-CA"/>
           </a:p>
@@ -691,7 +691,7 @@
           <a:p>
             <a:fld id="{B3674AC4-5004-4132-B6AA-0D083DFAD988}" type="datetimeFigureOut">
               <a:rPr lang="en-CA" smtClean="0"/>
-              <a:t>2016-12-01</a:t>
+              <a:t>2016-12-02</a:t>
             </a:fld>
             <a:endParaRPr lang="en-CA"/>
           </a:p>
@@ -866,7 +866,7 @@
           <a:p>
             <a:fld id="{B3674AC4-5004-4132-B6AA-0D083DFAD988}" type="datetimeFigureOut">
               <a:rPr lang="en-CA" smtClean="0"/>
-              <a:t>2016-12-01</a:t>
+              <a:t>2016-12-02</a:t>
             </a:fld>
             <a:endParaRPr lang="en-CA"/>
           </a:p>
@@ -1120,7 +1120,7 @@
           <a:p>
             <a:fld id="{B3674AC4-5004-4132-B6AA-0D083DFAD988}" type="datetimeFigureOut">
               <a:rPr lang="en-CA" smtClean="0"/>
-              <a:t>2016-12-01</a:t>
+              <a:t>2016-12-02</a:t>
             </a:fld>
             <a:endParaRPr lang="en-CA"/>
           </a:p>
@@ -1451,7 +1451,7 @@
           <a:p>
             <a:fld id="{B3674AC4-5004-4132-B6AA-0D083DFAD988}" type="datetimeFigureOut">
               <a:rPr lang="en-CA" smtClean="0"/>
-              <a:t>2016-12-01</a:t>
+              <a:t>2016-12-02</a:t>
             </a:fld>
             <a:endParaRPr lang="en-CA"/>
           </a:p>
@@ -1902,7 +1902,7 @@
           <a:p>
             <a:fld id="{B3674AC4-5004-4132-B6AA-0D083DFAD988}" type="datetimeFigureOut">
               <a:rPr lang="en-CA" smtClean="0"/>
-              <a:t>2016-12-01</a:t>
+              <a:t>2016-12-02</a:t>
             </a:fld>
             <a:endParaRPr lang="en-CA"/>
           </a:p>
@@ -2020,7 +2020,7 @@
           <a:p>
             <a:fld id="{B3674AC4-5004-4132-B6AA-0D083DFAD988}" type="datetimeFigureOut">
               <a:rPr lang="en-CA" smtClean="0"/>
-              <a:t>2016-12-01</a:t>
+              <a:t>2016-12-02</a:t>
             </a:fld>
             <a:endParaRPr lang="en-CA"/>
           </a:p>
@@ -2115,7 +2115,7 @@
           <a:p>
             <a:fld id="{B3674AC4-5004-4132-B6AA-0D083DFAD988}" type="datetimeFigureOut">
               <a:rPr lang="en-CA" smtClean="0"/>
-              <a:t>2016-12-01</a:t>
+              <a:t>2016-12-02</a:t>
             </a:fld>
             <a:endParaRPr lang="en-CA"/>
           </a:p>
@@ -2402,7 +2402,7 @@
           <a:p>
             <a:fld id="{B3674AC4-5004-4132-B6AA-0D083DFAD988}" type="datetimeFigureOut">
               <a:rPr lang="en-CA" smtClean="0"/>
-              <a:t>2016-12-01</a:t>
+              <a:t>2016-12-02</a:t>
             </a:fld>
             <a:endParaRPr lang="en-CA"/>
           </a:p>
@@ -2724,7 +2724,7 @@
           <a:p>
             <a:fld id="{B3674AC4-5004-4132-B6AA-0D083DFAD988}" type="datetimeFigureOut">
               <a:rPr lang="en-CA" smtClean="0"/>
-              <a:t>2016-12-01</a:t>
+              <a:t>2016-12-02</a:t>
             </a:fld>
             <a:endParaRPr lang="en-CA"/>
           </a:p>
@@ -2978,7 +2978,7 @@
           <a:p>
             <a:fld id="{B3674AC4-5004-4132-B6AA-0D083DFAD988}" type="datetimeFigureOut">
               <a:rPr lang="en-CA" smtClean="0"/>
-              <a:t>2016-12-01</a:t>
+              <a:t>2016-12-02</a:t>
             </a:fld>
             <a:endParaRPr lang="en-CA"/>
           </a:p>
@@ -6066,9 +6066,16 @@
           <a:bodyPr/>
           <a:lstStyle/>
           <a:p>
+            <a:endParaRPr lang="en-CA" dirty="0" smtClean="0"/>
+          </a:p>
+          <a:p>
             <a:r>
               <a:rPr lang="en-CA" dirty="0" smtClean="0"/>
-              <a:t>Google Forms for Usability Survey</a:t>
+              <a:t>Google </a:t>
+            </a:r>
+            <a:r>
+              <a:rPr lang="en-CA" dirty="0" smtClean="0"/>
+              <a:t>Forms for Usability Survey</a:t>
             </a:r>
           </a:p>
           <a:p>
@@ -6083,11 +6090,7 @@
           <a:p>
             <a:r>
               <a:rPr lang="en-CA" dirty="0" smtClean="0"/>
-              <a:t>90% of users gave the game 9/10 (and above) </a:t>
-            </a:r>
-            <a:r>
-              <a:rPr lang="en-CA" dirty="0" smtClean="0"/>
-              <a:t>for interface user-friendliness</a:t>
+              <a:t>90% of users gave the game 9/10 (and above) for interface user-friendliness</a:t>
             </a:r>
           </a:p>
           <a:p>
@@ -6233,9 +6236,19 @@
           <a:bodyPr/>
           <a:lstStyle/>
           <a:p>
+            <a:pPr marL="0" indent="0">
+              <a:buNone/>
+            </a:pPr>
+            <a:endParaRPr lang="en-CA" dirty="0"/>
+          </a:p>
+          <a:p>
             <a:r>
               <a:rPr lang="en-CA" dirty="0" smtClean="0"/>
-              <a:t>Usability Survey used to assess learnability as well</a:t>
+              <a:t>Usability </a:t>
+            </a:r>
+            <a:r>
+              <a:rPr lang="en-CA" dirty="0" smtClean="0"/>
+              <a:t>Survey used to assess learnability as well</a:t>
             </a:r>
           </a:p>
           <a:p>
@@ -6247,11 +6260,7 @@
             </a:pPr>
             <a:r>
               <a:rPr lang="en-CA" dirty="0" smtClean="0"/>
-              <a:t>100% of users </a:t>
-            </a:r>
-            <a:r>
-              <a:rPr lang="en-CA" dirty="0" smtClean="0"/>
-              <a:t>surveyed responded:</a:t>
+              <a:t>100% of users surveyed responded:</a:t>
             </a:r>
           </a:p>
           <a:p>
@@ -6317,9 +6326,16 @@
           <a:bodyPr/>
           <a:lstStyle/>
           <a:p>
+            <a:endParaRPr lang="en-CA" dirty="0" smtClean="0"/>
+          </a:p>
+          <a:p>
             <a:r>
               <a:rPr lang="en-CA" dirty="0" smtClean="0"/>
-              <a:t>Generic design allows for efficient implementation of future features</a:t>
+              <a:t>Generic </a:t>
+            </a:r>
+            <a:r>
+              <a:rPr lang="en-CA" dirty="0" smtClean="0"/>
+              <a:t>design allows for efficient implementation of future features</a:t>
             </a:r>
             <a:endParaRPr lang="en-CA" dirty="0"/>
           </a:p>

</xml_diff>